<commit_message>
Some updates to the f# intro.
</commit_message>
<xml_diff>
--- a/IntroToF#/IntroToFSharp.pptx
+++ b/IntroToF#/IntroToFSharp.pptx
@@ -3987,13 +3987,7 @@
               <a:rPr lang="en-US" dirty="0" smtClean="0">
                 <a:latin typeface="Segoe Condensed" pitchFamily="34" charset="0"/>
               </a:rPr>
-              <a:t>has </a:t>
-            </a:r>
-            <a:r>
-              <a:rPr lang="en-US" dirty="0" smtClean="0">
-                <a:latin typeface="Segoe Condensed" pitchFamily="34" charset="0"/>
-              </a:rPr>
-              <a:t>its roots in ML, a functional language created in the ‘70s.</a:t>
+              <a:t>has its roots in ML, a functional language created in the ‘70s.</a:t>
             </a:r>
           </a:p>
           <a:p>
@@ -4132,15 +4126,7 @@
           <a:p>
             <a:r>
               <a:rPr lang="en-US" sz="3000" dirty="0" smtClean="0"/>
-              <a:t>For most of us the reason we should care </a:t>
-            </a:r>
-            <a:r>
-              <a:rPr lang="en-US" sz="3000" dirty="0" smtClean="0"/>
-              <a:t>has to do with the functional paradigm, </a:t>
-            </a:r>
-            <a:r>
-              <a:rPr lang="en-US" sz="3000" dirty="0" smtClean="0"/>
-              <a:t>not about F# per se.</a:t>
+              <a:t>For most of us the reason we should care has to do with the functional paradigm, not about F# per se.</a:t>
             </a:r>
           </a:p>
           <a:p>
@@ -4790,25 +4776,7 @@
                 </a:solidFill>
                 <a:latin typeface="Segoe Condensed" pitchFamily="34" charset="0"/>
               </a:rPr>
-              <a:t>They </a:t>
-            </a:r>
-            <a:r>
-              <a:rPr lang="en-US" dirty="0" smtClean="0">
-                <a:solidFill>
-                  <a:schemeClr val="tx1"/>
-                </a:solidFill>
-                <a:latin typeface="Segoe Condensed" pitchFamily="34" charset="0"/>
-              </a:rPr>
-              <a:t>embody a </a:t>
-            </a:r>
-            <a:r>
-              <a:rPr lang="en-US" dirty="0" smtClean="0">
-                <a:solidFill>
-                  <a:schemeClr val="tx1"/>
-                </a:solidFill>
-                <a:latin typeface="Segoe Condensed" pitchFamily="34" charset="0"/>
-              </a:rPr>
-              <a:t>lot of stuff. </a:t>
+              <a:t>They embody a lot of stuff. </a:t>
             </a:r>
           </a:p>
           <a:p>
@@ -5248,15 +5216,32 @@
             <a:pPr lvl="1"/>
             <a:r>
               <a:rPr lang="en-US" dirty="0" smtClean="0"/>
-              <a:t>Primarily functional, no friction.</a:t>
+              <a:t>Primarily </a:t>
+            </a:r>
+            <a:r>
+              <a:rPr lang="en-US" dirty="0" smtClean="0"/>
+              <a:t>functional.</a:t>
             </a:r>
           </a:p>
           <a:p>
             <a:pPr lvl="1"/>
             <a:r>
               <a:rPr lang="en-US" dirty="0" smtClean="0"/>
-              <a:t>Supports imperative/OO, friction.</a:t>
-            </a:r>
+              <a:t>Largely declarative (Focusing on what not how).</a:t>
+            </a:r>
+            <a:endParaRPr lang="en-US" dirty="0" smtClean="0"/>
+          </a:p>
+          <a:p>
+            <a:pPr lvl="1"/>
+            <a:r>
+              <a:rPr lang="en-US" dirty="0" smtClean="0"/>
+              <a:t>Supports </a:t>
+            </a:r>
+            <a:r>
+              <a:rPr lang="en-US" dirty="0" smtClean="0"/>
+              <a:t>imperative/OO.</a:t>
+            </a:r>
+            <a:endParaRPr lang="en-US" dirty="0" smtClean="0"/>
           </a:p>
           <a:p>
             <a:r>
@@ -5268,29 +5253,72 @@
             <a:pPr lvl="1"/>
             <a:r>
               <a:rPr lang="en-US" dirty="0" smtClean="0"/>
-              <a:t>Purely functional languages do not allow mutable variables.</a:t>
+              <a:t>Purely functional languages do not allow </a:t>
+            </a:r>
+            <a:r>
+              <a:rPr lang="en-US" dirty="0" smtClean="0"/>
+              <a:t>variables</a:t>
+            </a:r>
+            <a:r>
+              <a:rPr lang="en-US" dirty="0" smtClean="0"/>
+              <a:t>.</a:t>
             </a:r>
           </a:p>
           <a:p>
             <a:pPr lvl="1"/>
             <a:r>
               <a:rPr lang="en-US" dirty="0" smtClean="0"/>
-              <a:t>F# is not purely functional so it does allow them to be defined with </a:t>
-            </a:r>
-            <a:r>
-              <a:rPr lang="en-US" smtClean="0"/>
-              <a:t>the “mutable” keyword.</a:t>
+              <a:t>F# is not purely functional so it does allow </a:t>
+            </a:r>
+            <a:r>
+              <a:rPr lang="en-US" dirty="0" smtClean="0"/>
+              <a:t>variables to </a:t>
+            </a:r>
+            <a:r>
+              <a:rPr lang="en-US" dirty="0" smtClean="0"/>
+              <a:t>be defined with the “mutable” keyword</a:t>
+            </a:r>
+            <a:r>
+              <a:rPr lang="en-US" dirty="0" smtClean="0"/>
+              <a:t>.</a:t>
+            </a:r>
+          </a:p>
+          <a:p>
+            <a:pPr lvl="1"/>
+            <a:r>
+              <a:rPr lang="en-US" dirty="0" smtClean="0"/>
+              <a:t>If your using “mutable” </a:t>
+            </a:r>
+            <a:r>
+              <a:rPr lang="en-US" dirty="0" err="1" smtClean="0"/>
+              <a:t>ur</a:t>
+            </a:r>
+            <a:r>
+              <a:rPr lang="en-US" dirty="0" smtClean="0"/>
+              <a:t> doing it wrong (Maybe).</a:t>
             </a:r>
             <a:endParaRPr lang="en-US" dirty="0" smtClean="0"/>
           </a:p>
           <a:p>
             <a:r>
               <a:rPr lang="en-US" dirty="0" smtClean="0"/>
-              <a:t>Strongly typed</a:t>
-            </a:r>
-          </a:p>
-          <a:p>
-            <a:pPr lvl="1"/>
+              <a:t>Strongly </a:t>
+            </a:r>
+            <a:r>
+              <a:rPr lang="en-US" dirty="0" smtClean="0"/>
+              <a:t>typed</a:t>
+            </a:r>
+          </a:p>
+          <a:p>
+            <a:r>
+              <a:rPr lang="en-US" dirty="0" smtClean="0"/>
+              <a:t>Makes use of type inference</a:t>
+            </a:r>
+          </a:p>
+          <a:p>
+            <a:endParaRPr lang="en-US" dirty="0" smtClean="0"/>
+          </a:p>
+          <a:p>
             <a:endParaRPr lang="en-US" dirty="0" smtClean="0"/>
           </a:p>
           <a:p>

</xml_diff>